<commit_message>
some modification on presentation
</commit_message>
<xml_diff>
--- a/Presentation.pptx
+++ b/Presentation.pptx
@@ -425,7 +425,7 @@
             <a:fld id="{2194DA84-9BF2-4D1D-989C-A0CF6764201C}" type="datetimeFigureOut">
               <a:rPr lang="en-US" smtClean="0"/>
               <a:pPr/>
-              <a:t>11/18/2016</a:t>
+              <a:t>11/21/2016</a:t>
             </a:fld>
             <a:endParaRPr lang="en-US"/>
           </a:p>
@@ -859,7 +859,7 @@
             <a:fld id="{2194DA84-9BF2-4D1D-989C-A0CF6764201C}" type="datetimeFigureOut">
               <a:rPr lang="en-US" smtClean="0"/>
               <a:pPr/>
-              <a:t>11/18/2016</a:t>
+              <a:t>11/21/2016</a:t>
             </a:fld>
             <a:endParaRPr lang="en-US"/>
           </a:p>
@@ -1210,7 +1210,7 @@
             <a:fld id="{2194DA84-9BF2-4D1D-989C-A0CF6764201C}" type="datetimeFigureOut">
               <a:rPr lang="en-US" smtClean="0"/>
               <a:pPr/>
-              <a:t>11/18/2016</a:t>
+              <a:t>11/21/2016</a:t>
             </a:fld>
             <a:endParaRPr lang="en-US"/>
           </a:p>
@@ -1630,7 +1630,7 @@
             <a:fld id="{2194DA84-9BF2-4D1D-989C-A0CF6764201C}" type="datetimeFigureOut">
               <a:rPr lang="en-US" smtClean="0"/>
               <a:pPr/>
-              <a:t>11/18/2016</a:t>
+              <a:t>11/21/2016</a:t>
             </a:fld>
             <a:endParaRPr lang="en-US"/>
           </a:p>
@@ -2213,7 +2213,7 @@
             <a:fld id="{2194DA84-9BF2-4D1D-989C-A0CF6764201C}" type="datetimeFigureOut">
               <a:rPr lang="en-US" smtClean="0"/>
               <a:pPr/>
-              <a:t>11/18/2016</a:t>
+              <a:t>11/21/2016</a:t>
             </a:fld>
             <a:endParaRPr lang="en-US"/>
           </a:p>
@@ -2909,7 +2909,7 @@
             <a:fld id="{2194DA84-9BF2-4D1D-989C-A0CF6764201C}" type="datetimeFigureOut">
               <a:rPr lang="en-US" smtClean="0"/>
               <a:pPr/>
-              <a:t>11/18/2016</a:t>
+              <a:t>11/21/2016</a:t>
             </a:fld>
             <a:endParaRPr lang="en-US"/>
           </a:p>
@@ -3837,7 +3837,7 @@
             <a:fld id="{2194DA84-9BF2-4D1D-989C-A0CF6764201C}" type="datetimeFigureOut">
               <a:rPr lang="en-US" smtClean="0"/>
               <a:pPr/>
-              <a:t>11/18/2016</a:t>
+              <a:t>11/21/2016</a:t>
             </a:fld>
             <a:endParaRPr lang="en-US"/>
           </a:p>
@@ -4170,7 +4170,7 @@
             <a:fld id="{2194DA84-9BF2-4D1D-989C-A0CF6764201C}" type="datetimeFigureOut">
               <a:rPr lang="en-US" smtClean="0"/>
               <a:pPr/>
-              <a:t>11/18/2016</a:t>
+              <a:t>11/21/2016</a:t>
             </a:fld>
             <a:endParaRPr lang="en-US"/>
           </a:p>
@@ -4451,7 +4451,7 @@
             <a:fld id="{2194DA84-9BF2-4D1D-989C-A0CF6764201C}" type="datetimeFigureOut">
               <a:rPr lang="en-US" smtClean="0"/>
               <a:pPr/>
-              <a:t>11/18/2016</a:t>
+              <a:t>11/21/2016</a:t>
             </a:fld>
             <a:endParaRPr lang="en-US"/>
           </a:p>
@@ -4789,7 +4789,7 @@
             <a:fld id="{2194DA84-9BF2-4D1D-989C-A0CF6764201C}" type="datetimeFigureOut">
               <a:rPr lang="en-US" smtClean="0"/>
               <a:pPr/>
-              <a:t>11/18/2016</a:t>
+              <a:t>11/21/2016</a:t>
             </a:fld>
             <a:endParaRPr lang="en-US"/>
           </a:p>
@@ -5198,7 +5198,7 @@
             <a:fld id="{2194DA84-9BF2-4D1D-989C-A0CF6764201C}" type="datetimeFigureOut">
               <a:rPr lang="en-US" smtClean="0"/>
               <a:pPr/>
-              <a:t>11/18/2016</a:t>
+              <a:t>11/21/2016</a:t>
             </a:fld>
             <a:endParaRPr lang="en-US"/>
           </a:p>
@@ -5599,7 +5599,7 @@
             <a:fld id="{2194DA84-9BF2-4D1D-989C-A0CF6764201C}" type="datetimeFigureOut">
               <a:rPr lang="en-US" smtClean="0"/>
               <a:pPr/>
-              <a:t>11/18/2016</a:t>
+              <a:t>11/21/2016</a:t>
             </a:fld>
             <a:endParaRPr lang="en-US"/>
           </a:p>
@@ -6120,7 +6120,7 @@
             <a:fld id="{2194DA84-9BF2-4D1D-989C-A0CF6764201C}" type="datetimeFigureOut">
               <a:rPr lang="en-US" smtClean="0"/>
               <a:pPr/>
-              <a:t>11/18/2016</a:t>
+              <a:t>11/21/2016</a:t>
             </a:fld>
             <a:endParaRPr lang="en-US"/>
           </a:p>
@@ -6392,7 +6392,7 @@
             <a:fld id="{2194DA84-9BF2-4D1D-989C-A0CF6764201C}" type="datetimeFigureOut">
               <a:rPr lang="en-US" smtClean="0"/>
               <a:pPr/>
-              <a:t>11/18/2016</a:t>
+              <a:t>11/21/2016</a:t>
             </a:fld>
             <a:endParaRPr lang="en-US"/>
           </a:p>
@@ -6556,7 +6556,7 @@
             <a:fld id="{2194DA84-9BF2-4D1D-989C-A0CF6764201C}" type="datetimeFigureOut">
               <a:rPr lang="en-US" smtClean="0"/>
               <a:pPr/>
-              <a:t>11/18/2016</a:t>
+              <a:t>11/21/2016</a:t>
             </a:fld>
             <a:endParaRPr lang="en-US"/>
           </a:p>
@@ -6961,7 +6961,7 @@
             <a:fld id="{2194DA84-9BF2-4D1D-989C-A0CF6764201C}" type="datetimeFigureOut">
               <a:rPr lang="en-US" smtClean="0"/>
               <a:pPr/>
-              <a:t>11/18/2016</a:t>
+              <a:t>11/21/2016</a:t>
             </a:fld>
             <a:endParaRPr lang="en-US"/>
           </a:p>
@@ -7385,7 +7385,7 @@
             <a:fld id="{2194DA84-9BF2-4D1D-989C-A0CF6764201C}" type="datetimeFigureOut">
               <a:rPr lang="en-US" smtClean="0"/>
               <a:pPr/>
-              <a:t>11/18/2016</a:t>
+              <a:t>11/21/2016</a:t>
             </a:fld>
             <a:endParaRPr lang="en-US"/>
           </a:p>
@@ -7661,7 +7661,7 @@
             <a:fld id="{2194DA84-9BF2-4D1D-989C-A0CF6764201C}" type="datetimeFigureOut">
               <a:rPr lang="en-US" smtClean="0"/>
               <a:pPr/>
-              <a:t>11/18/2016</a:t>
+              <a:t>11/21/2016</a:t>
             </a:fld>
             <a:endParaRPr lang="en-US"/>
           </a:p>
@@ -8578,13 +8578,21 @@
           <a:p>
             <a:r>
               <a:rPr lang="en-US" dirty="0" smtClean="0"/>
-              <a:t>We identified the referential integrity in our relations and made sure we abide by them</a:t>
-            </a:r>
-          </a:p>
-          <a:p>
+              <a:t>We identified the </a:t>
+            </a:r>
+            <a:r>
+              <a:rPr lang="en-US" smtClean="0"/>
+              <a:t>referential integrity </a:t>
+            </a:r>
             <a:r>
               <a:rPr lang="en-US" dirty="0" smtClean="0"/>
-              <a:t>We have full key dependency, we avoided the use of partial and transitive dependency.</a:t>
+              <a:t>in our relations and made sure we abide by them.</a:t>
+            </a:r>
+          </a:p>
+          <a:p>
+            <a:r>
+              <a:rPr lang="en-US" dirty="0" smtClean="0"/>
+              <a:t>We have full key dependency, we don't use the partial and transitive dependency.</a:t>
             </a:r>
           </a:p>
           <a:p>
@@ -8675,8 +8683,13 @@
           <a:p>
             <a:r>
               <a:rPr lang="en-US" dirty="0" smtClean="0"/>
-              <a:t>Our queries are running fast enough, and most depends on PKs.</a:t>
-            </a:r>
+              <a:t>Our queries are running fast enough, and most depends on </a:t>
+            </a:r>
+            <a:r>
+              <a:rPr lang="en-US" dirty="0" smtClean="0"/>
+              <a:t>PKs and FKs.</a:t>
+            </a:r>
+            <a:endParaRPr lang="en-US" dirty="0" smtClean="0"/>
           </a:p>
           <a:p>
             <a:r>
@@ -8752,8 +8765,13 @@
           <a:p>
             <a:r>
               <a:rPr lang="en-US" dirty="0" smtClean="0"/>
-              <a:t>Although data access is with the use of SQL select statement, our users wont be writing the code</a:t>
-            </a:r>
+              <a:t>Although data access is with the use of SQL select statement, our users wont be writing the </a:t>
+            </a:r>
+            <a:r>
+              <a:rPr lang="en-US" dirty="0" smtClean="0"/>
+              <a:t>code.</a:t>
+            </a:r>
+            <a:endParaRPr lang="en-US" dirty="0" smtClean="0"/>
           </a:p>
           <a:p>
             <a:r>
@@ -9385,7 +9403,7 @@
           <a:p>
             <a:r>
               <a:rPr lang="en-US" dirty="0" smtClean="0"/>
-              <a:t>Will be in Saudi Arabia.</a:t>
+              <a:t>It provides emergency management services and courses. </a:t>
             </a:r>
           </a:p>
           <a:p>
@@ -9712,12 +9730,8 @@
           <a:lstStyle/>
           <a:p>
             <a:r>
-              <a:rPr lang="en-US" dirty="0"/>
-              <a:t>I</a:t>
-            </a:r>
-            <a:r>
               <a:rPr lang="en-US" dirty="0" smtClean="0"/>
-              <a:t>mprovement</a:t>
+              <a:t>Improvements</a:t>
             </a:r>
             <a:endParaRPr lang="en-US" dirty="0"/>
           </a:p>
@@ -9740,8 +9754,14 @@
           <a:p>
             <a:r>
               <a:rPr lang="en-US" dirty="0" smtClean="0"/>
-              <a:t>We will like to improve our design in the future, time permitting to include more functionalities.</a:t>
-            </a:r>
+              <a:t>We will like to improve our design in the future, time permitting to include more functionalities</a:t>
+            </a:r>
+            <a:r>
+              <a:rPr lang="en-US" dirty="0" smtClean="0"/>
+              <a:t>.</a:t>
+            </a:r>
+          </a:p>
+          <a:p>
             <a:endParaRPr lang="en-US" dirty="0"/>
           </a:p>
         </p:txBody>
@@ -9811,7 +9831,7 @@
           <a:p>
             <a:r>
               <a:rPr lang="en-US" dirty="0" smtClean="0"/>
-              <a:t>Emergency management</a:t>
+              <a:t>Emergency operation plan.</a:t>
             </a:r>
           </a:p>
           <a:p>
@@ -9994,7 +10014,7 @@
           <a:p>
             <a:r>
               <a:rPr lang="en-US" dirty="0" smtClean="0"/>
-              <a:t>CERT(Community emergency response training</a:t>
+              <a:t>CERT(Community emergency response training).</a:t>
             </a:r>
           </a:p>
           <a:p>
@@ -10011,12 +10031,8 @@
           </a:p>
           <a:p>
             <a:r>
-              <a:rPr lang="en-US" dirty="0" err="1" smtClean="0"/>
-              <a:t>Fema</a:t>
-            </a:r>
-            <a:r>
               <a:rPr lang="en-US" dirty="0" smtClean="0"/>
-              <a:t> courses.</a:t>
+              <a:t>FEMA courses.</a:t>
             </a:r>
             <a:endParaRPr lang="en-US" dirty="0"/>
           </a:p>

</xml_diff>

<commit_message>
Revert "modification after meeting"
This reverts commit f3ceee15a35b36a53e36209de8af57acc0cf5d45.
</commit_message>
<xml_diff>
--- a/Presentation.pptx
+++ b/Presentation.pptx
@@ -425,7 +425,7 @@
             <a:fld id="{2194DA84-9BF2-4D1D-989C-A0CF6764201C}" type="datetimeFigureOut">
               <a:rPr lang="en-US" smtClean="0"/>
               <a:pPr/>
-              <a:t>11/30/2016</a:t>
+              <a:t>11/29/2016</a:t>
             </a:fld>
             <a:endParaRPr lang="en-US"/>
           </a:p>
@@ -859,7 +859,7 @@
             <a:fld id="{2194DA84-9BF2-4D1D-989C-A0CF6764201C}" type="datetimeFigureOut">
               <a:rPr lang="en-US" smtClean="0"/>
               <a:pPr/>
-              <a:t>11/30/2016</a:t>
+              <a:t>11/29/2016</a:t>
             </a:fld>
             <a:endParaRPr lang="en-US"/>
           </a:p>
@@ -1210,7 +1210,7 @@
             <a:fld id="{2194DA84-9BF2-4D1D-989C-A0CF6764201C}" type="datetimeFigureOut">
               <a:rPr lang="en-US" smtClean="0"/>
               <a:pPr/>
-              <a:t>11/30/2016</a:t>
+              <a:t>11/29/2016</a:t>
             </a:fld>
             <a:endParaRPr lang="en-US"/>
           </a:p>
@@ -1630,7 +1630,7 @@
             <a:fld id="{2194DA84-9BF2-4D1D-989C-A0CF6764201C}" type="datetimeFigureOut">
               <a:rPr lang="en-US" smtClean="0"/>
               <a:pPr/>
-              <a:t>11/30/2016</a:t>
+              <a:t>11/29/2016</a:t>
             </a:fld>
             <a:endParaRPr lang="en-US"/>
           </a:p>
@@ -2213,7 +2213,7 @@
             <a:fld id="{2194DA84-9BF2-4D1D-989C-A0CF6764201C}" type="datetimeFigureOut">
               <a:rPr lang="en-US" smtClean="0"/>
               <a:pPr/>
-              <a:t>11/30/2016</a:t>
+              <a:t>11/29/2016</a:t>
             </a:fld>
             <a:endParaRPr lang="en-US"/>
           </a:p>
@@ -2909,7 +2909,7 @@
             <a:fld id="{2194DA84-9BF2-4D1D-989C-A0CF6764201C}" type="datetimeFigureOut">
               <a:rPr lang="en-US" smtClean="0"/>
               <a:pPr/>
-              <a:t>11/30/2016</a:t>
+              <a:t>11/29/2016</a:t>
             </a:fld>
             <a:endParaRPr lang="en-US"/>
           </a:p>
@@ -3837,7 +3837,7 @@
             <a:fld id="{2194DA84-9BF2-4D1D-989C-A0CF6764201C}" type="datetimeFigureOut">
               <a:rPr lang="en-US" smtClean="0"/>
               <a:pPr/>
-              <a:t>11/30/2016</a:t>
+              <a:t>11/29/2016</a:t>
             </a:fld>
             <a:endParaRPr lang="en-US"/>
           </a:p>
@@ -4170,7 +4170,7 @@
             <a:fld id="{2194DA84-9BF2-4D1D-989C-A0CF6764201C}" type="datetimeFigureOut">
               <a:rPr lang="en-US" smtClean="0"/>
               <a:pPr/>
-              <a:t>11/30/2016</a:t>
+              <a:t>11/29/2016</a:t>
             </a:fld>
             <a:endParaRPr lang="en-US"/>
           </a:p>
@@ -4451,7 +4451,7 @@
             <a:fld id="{2194DA84-9BF2-4D1D-989C-A0CF6764201C}" type="datetimeFigureOut">
               <a:rPr lang="en-US" smtClean="0"/>
               <a:pPr/>
-              <a:t>11/30/2016</a:t>
+              <a:t>11/29/2016</a:t>
             </a:fld>
             <a:endParaRPr lang="en-US"/>
           </a:p>
@@ -4789,7 +4789,7 @@
             <a:fld id="{2194DA84-9BF2-4D1D-989C-A0CF6764201C}" type="datetimeFigureOut">
               <a:rPr lang="en-US" smtClean="0"/>
               <a:pPr/>
-              <a:t>11/30/2016</a:t>
+              <a:t>11/29/2016</a:t>
             </a:fld>
             <a:endParaRPr lang="en-US"/>
           </a:p>
@@ -5198,7 +5198,7 @@
             <a:fld id="{2194DA84-9BF2-4D1D-989C-A0CF6764201C}" type="datetimeFigureOut">
               <a:rPr lang="en-US" smtClean="0"/>
               <a:pPr/>
-              <a:t>11/30/2016</a:t>
+              <a:t>11/29/2016</a:t>
             </a:fld>
             <a:endParaRPr lang="en-US"/>
           </a:p>
@@ -5599,7 +5599,7 @@
             <a:fld id="{2194DA84-9BF2-4D1D-989C-A0CF6764201C}" type="datetimeFigureOut">
               <a:rPr lang="en-US" smtClean="0"/>
               <a:pPr/>
-              <a:t>11/30/2016</a:t>
+              <a:t>11/29/2016</a:t>
             </a:fld>
             <a:endParaRPr lang="en-US"/>
           </a:p>
@@ -6120,7 +6120,7 @@
             <a:fld id="{2194DA84-9BF2-4D1D-989C-A0CF6764201C}" type="datetimeFigureOut">
               <a:rPr lang="en-US" smtClean="0"/>
               <a:pPr/>
-              <a:t>11/30/2016</a:t>
+              <a:t>11/29/2016</a:t>
             </a:fld>
             <a:endParaRPr lang="en-US"/>
           </a:p>
@@ -6392,7 +6392,7 @@
             <a:fld id="{2194DA84-9BF2-4D1D-989C-A0CF6764201C}" type="datetimeFigureOut">
               <a:rPr lang="en-US" smtClean="0"/>
               <a:pPr/>
-              <a:t>11/30/2016</a:t>
+              <a:t>11/29/2016</a:t>
             </a:fld>
             <a:endParaRPr lang="en-US"/>
           </a:p>
@@ -6556,7 +6556,7 @@
             <a:fld id="{2194DA84-9BF2-4D1D-989C-A0CF6764201C}" type="datetimeFigureOut">
               <a:rPr lang="en-US" smtClean="0"/>
               <a:pPr/>
-              <a:t>11/30/2016</a:t>
+              <a:t>11/29/2016</a:t>
             </a:fld>
             <a:endParaRPr lang="en-US"/>
           </a:p>
@@ -6961,7 +6961,7 @@
             <a:fld id="{2194DA84-9BF2-4D1D-989C-A0CF6764201C}" type="datetimeFigureOut">
               <a:rPr lang="en-US" smtClean="0"/>
               <a:pPr/>
-              <a:t>11/30/2016</a:t>
+              <a:t>11/29/2016</a:t>
             </a:fld>
             <a:endParaRPr lang="en-US"/>
           </a:p>
@@ -7385,7 +7385,7 @@
             <a:fld id="{2194DA84-9BF2-4D1D-989C-A0CF6764201C}" type="datetimeFigureOut">
               <a:rPr lang="en-US" smtClean="0"/>
               <a:pPr/>
-              <a:t>11/30/2016</a:t>
+              <a:t>11/29/2016</a:t>
             </a:fld>
             <a:endParaRPr lang="en-US"/>
           </a:p>
@@ -7521,7 +7521,7 @@
           </a:prstGeom>
           <a:extLst>
             <a:ext uri="{909E8E84-426E-40dd-AFC4-6F175D3DCCD1}">
-              <a14:hiddenFill xmlns:a14="http://schemas.microsoft.com/office/drawing/2010/main" xmlns="">
+              <a14:hiddenFill xmlns="" xmlns:a14="http://schemas.microsoft.com/office/drawing/2010/main">
                 <a:solidFill>
                   <a:srgbClr val="FFFFFF"/>
                 </a:solidFill>
@@ -7661,7 +7661,7 @@
             <a:fld id="{2194DA84-9BF2-4D1D-989C-A0CF6764201C}" type="datetimeFigureOut">
               <a:rPr lang="en-US" smtClean="0"/>
               <a:pPr/>
-              <a:t>11/30/2016</a:t>
+              <a:t>11/29/2016</a:t>
             </a:fld>
             <a:endParaRPr lang="en-US"/>
           </a:p>
@@ -8710,7 +8710,15 @@
           <a:p>
             <a:r>
               <a:rPr lang="en-US" dirty="0" smtClean="0"/>
-              <a:t>Indexes are expensive and take time to maintain, we will use them only if need be.</a:t>
+              <a:t>Indexes are expensive and </a:t>
+            </a:r>
+            <a:r>
+              <a:rPr lang="en-US" dirty="0" smtClean="0"/>
+              <a:t>take </a:t>
+            </a:r>
+            <a:r>
+              <a:rPr lang="en-US" dirty="0" smtClean="0"/>
+              <a:t>time to maintain, we will use them only if need be.</a:t>
             </a:r>
             <a:endParaRPr lang="en-US" dirty="0"/>
           </a:p>
@@ -8788,7 +8796,31 @@
           <a:p>
             <a:r>
               <a:rPr lang="en-US" dirty="0" smtClean="0"/>
-              <a:t>Although data access is done with SQL select statements, our users won’t be writing the code.</a:t>
+              <a:t>Although data access is </a:t>
+            </a:r>
+            <a:r>
+              <a:rPr lang="en-US" dirty="0" smtClean="0"/>
+              <a:t>done with SQL </a:t>
+            </a:r>
+            <a:r>
+              <a:rPr lang="en-US" dirty="0" smtClean="0"/>
+              <a:t>select </a:t>
+            </a:r>
+            <a:r>
+              <a:rPr lang="en-US" dirty="0" smtClean="0"/>
+              <a:t>statements, </a:t>
+            </a:r>
+            <a:r>
+              <a:rPr lang="en-US" dirty="0" smtClean="0"/>
+              <a:t>our users </a:t>
+            </a:r>
+            <a:r>
+              <a:rPr lang="en-US" dirty="0" smtClean="0"/>
+              <a:t>won’t </a:t>
+            </a:r>
+            <a:r>
+              <a:rPr lang="en-US" dirty="0" smtClean="0"/>
+              <a:t>be writing the code.</a:t>
             </a:r>
           </a:p>
           <a:p>
@@ -9255,11 +9287,13 @@
       </p:sp>
       <p:pic>
         <p:nvPicPr>
-          <p:cNvPr id="4" name="Picture 3"/>
+          <p:cNvPr id="2050" name="Picture 2"/>
           <p:cNvPicPr>
-            <a:picLocks noChangeAspect="1"/>
+            <a:picLocks noGrp="1" noChangeAspect="1" noChangeArrowheads="1"/>
           </p:cNvPicPr>
-          <p:nvPr/>
+          <p:nvPr>
+            <p:ph idx="1"/>
+          </p:nvPr>
         </p:nvPicPr>
         <p:blipFill>
           <a:blip r:embed="rId2"/>
@@ -9267,10 +9301,10 @@
             <a:fillRect/>
           </a:stretch>
         </p:blipFill>
-        <p:spPr>
+        <p:spPr bwMode="auto">
           <a:xfrm>
-            <a:off x="1752600" y="2133600"/>
-            <a:ext cx="5105400" cy="4421823"/>
+            <a:off x="2133600" y="2209800"/>
+            <a:ext cx="4495800" cy="4319724"/>
           </a:xfrm>
           <a:prstGeom prst="rect">
             <a:avLst/>
@@ -9474,7 +9508,15 @@
           <a:p>
             <a:r>
               <a:rPr lang="en-US" dirty="0" smtClean="0"/>
-              <a:t>Provides services for organizations.</a:t>
+              <a:t>Provides </a:t>
+            </a:r>
+            <a:r>
+              <a:rPr lang="en-US" dirty="0" smtClean="0"/>
+              <a:t>services </a:t>
+            </a:r>
+            <a:r>
+              <a:rPr lang="en-US" dirty="0" smtClean="0"/>
+              <a:t>for organizations.</a:t>
             </a:r>
           </a:p>
           <a:p>
@@ -9847,7 +9889,23 @@
           <a:p>
             <a:r>
               <a:rPr lang="en-US" dirty="0" smtClean="0"/>
-              <a:t>We would like to improve our design in the future, time permitting, to include more functionalities.</a:t>
+              <a:t>We </a:t>
+            </a:r>
+            <a:r>
+              <a:rPr lang="en-US" dirty="0" smtClean="0"/>
+              <a:t>would </a:t>
+            </a:r>
+            <a:r>
+              <a:rPr lang="en-US" dirty="0" smtClean="0"/>
+              <a:t>like to improve our design in the future, time </a:t>
+            </a:r>
+            <a:r>
+              <a:rPr lang="en-US" dirty="0" smtClean="0"/>
+              <a:t>permitting, </a:t>
+            </a:r>
+            <a:r>
+              <a:rPr lang="en-US" dirty="0" smtClean="0"/>
+              <a:t>to include more functionalities.</a:t>
             </a:r>
           </a:p>
           <a:p>
@@ -10045,8 +10103,13 @@
           <a:p>
             <a:r>
               <a:rPr lang="en-US" dirty="0" smtClean="0"/>
-              <a:t>Red Crescent Authority.</a:t>
-            </a:r>
+              <a:t>Red Crescent </a:t>
+            </a:r>
+            <a:r>
+              <a:rPr lang="en-US" dirty="0" smtClean="0"/>
+              <a:t>Authority.</a:t>
+            </a:r>
+            <a:endParaRPr lang="en-US" dirty="0" smtClean="0"/>
           </a:p>
           <a:p>
             <a:r>

</xml_diff>

<commit_message>
update the final report-link of project
adding the link to fianl report
</commit_message>
<xml_diff>
--- a/Presentation.pptx
+++ b/Presentation.pptx
@@ -425,7 +425,7 @@
             <a:fld id="{2194DA84-9BF2-4D1D-989C-A0CF6764201C}" type="datetimeFigureOut">
               <a:rPr lang="en-US" smtClean="0"/>
               <a:pPr/>
-              <a:t>11/30/2016</a:t>
+              <a:t>12/2/2016</a:t>
             </a:fld>
             <a:endParaRPr lang="en-US"/>
           </a:p>
@@ -859,7 +859,7 @@
             <a:fld id="{2194DA84-9BF2-4D1D-989C-A0CF6764201C}" type="datetimeFigureOut">
               <a:rPr lang="en-US" smtClean="0"/>
               <a:pPr/>
-              <a:t>11/30/2016</a:t>
+              <a:t>12/2/2016</a:t>
             </a:fld>
             <a:endParaRPr lang="en-US"/>
           </a:p>
@@ -1210,7 +1210,7 @@
             <a:fld id="{2194DA84-9BF2-4D1D-989C-A0CF6764201C}" type="datetimeFigureOut">
               <a:rPr lang="en-US" smtClean="0"/>
               <a:pPr/>
-              <a:t>11/30/2016</a:t>
+              <a:t>12/2/2016</a:t>
             </a:fld>
             <a:endParaRPr lang="en-US"/>
           </a:p>
@@ -1630,7 +1630,7 @@
             <a:fld id="{2194DA84-9BF2-4D1D-989C-A0CF6764201C}" type="datetimeFigureOut">
               <a:rPr lang="en-US" smtClean="0"/>
               <a:pPr/>
-              <a:t>11/30/2016</a:t>
+              <a:t>12/2/2016</a:t>
             </a:fld>
             <a:endParaRPr lang="en-US"/>
           </a:p>
@@ -2213,7 +2213,7 @@
             <a:fld id="{2194DA84-9BF2-4D1D-989C-A0CF6764201C}" type="datetimeFigureOut">
               <a:rPr lang="en-US" smtClean="0"/>
               <a:pPr/>
-              <a:t>11/30/2016</a:t>
+              <a:t>12/2/2016</a:t>
             </a:fld>
             <a:endParaRPr lang="en-US"/>
           </a:p>
@@ -2909,7 +2909,7 @@
             <a:fld id="{2194DA84-9BF2-4D1D-989C-A0CF6764201C}" type="datetimeFigureOut">
               <a:rPr lang="en-US" smtClean="0"/>
               <a:pPr/>
-              <a:t>11/30/2016</a:t>
+              <a:t>12/2/2016</a:t>
             </a:fld>
             <a:endParaRPr lang="en-US"/>
           </a:p>
@@ -3837,7 +3837,7 @@
             <a:fld id="{2194DA84-9BF2-4D1D-989C-A0CF6764201C}" type="datetimeFigureOut">
               <a:rPr lang="en-US" smtClean="0"/>
               <a:pPr/>
-              <a:t>11/30/2016</a:t>
+              <a:t>12/2/2016</a:t>
             </a:fld>
             <a:endParaRPr lang="en-US"/>
           </a:p>
@@ -4170,7 +4170,7 @@
             <a:fld id="{2194DA84-9BF2-4D1D-989C-A0CF6764201C}" type="datetimeFigureOut">
               <a:rPr lang="en-US" smtClean="0"/>
               <a:pPr/>
-              <a:t>11/30/2016</a:t>
+              <a:t>12/2/2016</a:t>
             </a:fld>
             <a:endParaRPr lang="en-US"/>
           </a:p>
@@ -4451,7 +4451,7 @@
             <a:fld id="{2194DA84-9BF2-4D1D-989C-A0CF6764201C}" type="datetimeFigureOut">
               <a:rPr lang="en-US" smtClean="0"/>
               <a:pPr/>
-              <a:t>11/30/2016</a:t>
+              <a:t>12/2/2016</a:t>
             </a:fld>
             <a:endParaRPr lang="en-US"/>
           </a:p>
@@ -4789,7 +4789,7 @@
             <a:fld id="{2194DA84-9BF2-4D1D-989C-A0CF6764201C}" type="datetimeFigureOut">
               <a:rPr lang="en-US" smtClean="0"/>
               <a:pPr/>
-              <a:t>11/30/2016</a:t>
+              <a:t>12/2/2016</a:t>
             </a:fld>
             <a:endParaRPr lang="en-US"/>
           </a:p>
@@ -5198,7 +5198,7 @@
             <a:fld id="{2194DA84-9BF2-4D1D-989C-A0CF6764201C}" type="datetimeFigureOut">
               <a:rPr lang="en-US" smtClean="0"/>
               <a:pPr/>
-              <a:t>11/30/2016</a:t>
+              <a:t>12/2/2016</a:t>
             </a:fld>
             <a:endParaRPr lang="en-US"/>
           </a:p>
@@ -5599,7 +5599,7 @@
             <a:fld id="{2194DA84-9BF2-4D1D-989C-A0CF6764201C}" type="datetimeFigureOut">
               <a:rPr lang="en-US" smtClean="0"/>
               <a:pPr/>
-              <a:t>11/30/2016</a:t>
+              <a:t>12/2/2016</a:t>
             </a:fld>
             <a:endParaRPr lang="en-US"/>
           </a:p>
@@ -6120,7 +6120,7 @@
             <a:fld id="{2194DA84-9BF2-4D1D-989C-A0CF6764201C}" type="datetimeFigureOut">
               <a:rPr lang="en-US" smtClean="0"/>
               <a:pPr/>
-              <a:t>11/30/2016</a:t>
+              <a:t>12/2/2016</a:t>
             </a:fld>
             <a:endParaRPr lang="en-US"/>
           </a:p>
@@ -6392,7 +6392,7 @@
             <a:fld id="{2194DA84-9BF2-4D1D-989C-A0CF6764201C}" type="datetimeFigureOut">
               <a:rPr lang="en-US" smtClean="0"/>
               <a:pPr/>
-              <a:t>11/30/2016</a:t>
+              <a:t>12/2/2016</a:t>
             </a:fld>
             <a:endParaRPr lang="en-US"/>
           </a:p>
@@ -6556,7 +6556,7 @@
             <a:fld id="{2194DA84-9BF2-4D1D-989C-A0CF6764201C}" type="datetimeFigureOut">
               <a:rPr lang="en-US" smtClean="0"/>
               <a:pPr/>
-              <a:t>11/30/2016</a:t>
+              <a:t>12/2/2016</a:t>
             </a:fld>
             <a:endParaRPr lang="en-US"/>
           </a:p>
@@ -6961,7 +6961,7 @@
             <a:fld id="{2194DA84-9BF2-4D1D-989C-A0CF6764201C}" type="datetimeFigureOut">
               <a:rPr lang="en-US" smtClean="0"/>
               <a:pPr/>
-              <a:t>11/30/2016</a:t>
+              <a:t>12/2/2016</a:t>
             </a:fld>
             <a:endParaRPr lang="en-US"/>
           </a:p>
@@ -7385,7 +7385,7 @@
             <a:fld id="{2194DA84-9BF2-4D1D-989C-A0CF6764201C}" type="datetimeFigureOut">
               <a:rPr lang="en-US" smtClean="0"/>
               <a:pPr/>
-              <a:t>11/30/2016</a:t>
+              <a:t>12/2/2016</a:t>
             </a:fld>
             <a:endParaRPr lang="en-US"/>
           </a:p>
@@ -7521,7 +7521,7 @@
           </a:prstGeom>
           <a:extLst>
             <a:ext uri="{909E8E84-426E-40dd-AFC4-6F175D3DCCD1}">
-              <a14:hiddenFill xmlns:a14="http://schemas.microsoft.com/office/drawing/2010/main" xmlns="">
+              <a14:hiddenFill xmlns="" xmlns:a14="http://schemas.microsoft.com/office/drawing/2010/main">
                 <a:solidFill>
                   <a:srgbClr val="FFFFFF"/>
                 </a:solidFill>
@@ -7661,7 +7661,7 @@
             <a:fld id="{2194DA84-9BF2-4D1D-989C-A0CF6764201C}" type="datetimeFigureOut">
               <a:rPr lang="en-US" smtClean="0"/>
               <a:pPr/>
-              <a:t>11/30/2016</a:t>
+              <a:t>12/2/2016</a:t>
             </a:fld>
             <a:endParaRPr lang="en-US"/>
           </a:p>
@@ -8869,13 +8869,11 @@
       </p:sp>
       <p:pic>
         <p:nvPicPr>
-          <p:cNvPr id="1026" name="Picture 2"/>
+          <p:cNvPr id="4" name="Picture 3"/>
           <p:cNvPicPr>
-            <a:picLocks noGrp="1" noChangeAspect="1" noChangeArrowheads="1"/>
+            <a:picLocks noChangeAspect="1"/>
           </p:cNvPicPr>
-          <p:nvPr>
-            <p:ph idx="1"/>
-          </p:nvPr>
+          <p:nvPr/>
         </p:nvPicPr>
         <p:blipFill>
           <a:blip r:embed="rId2"/>
@@ -8883,10 +8881,10 @@
             <a:fillRect/>
           </a:stretch>
         </p:blipFill>
-        <p:spPr bwMode="auto">
+        <p:spPr>
           <a:xfrm>
-            <a:off x="2667000" y="2209800"/>
-            <a:ext cx="2894806" cy="4193299"/>
+            <a:off x="2495550" y="2133600"/>
+            <a:ext cx="3752850" cy="4571999"/>
           </a:xfrm>
           <a:prstGeom prst="rect">
             <a:avLst/>
@@ -9349,7 +9347,7 @@
       </p:sp>
       <p:pic>
         <p:nvPicPr>
-          <p:cNvPr id="3" name="Picture 2"/>
+          <p:cNvPr id="4" name="Picture 3"/>
           <p:cNvPicPr>
             <a:picLocks noChangeAspect="1"/>
           </p:cNvPicPr>
@@ -9363,8 +9361,8 @@
         </p:blipFill>
         <p:spPr>
           <a:xfrm>
-            <a:off x="2438400" y="2286000"/>
-            <a:ext cx="3498382" cy="4142037"/>
+            <a:off x="2362200" y="2133600"/>
+            <a:ext cx="4191000" cy="4524375"/>
           </a:xfrm>
           <a:prstGeom prst="rect">
             <a:avLst/>

</xml_diff>